<commit_message>
semana 4 sesion 2
</commit_message>
<xml_diff>
--- a/Recursos/1. JavaScript.pptx
+++ b/Recursos/1. JavaScript.pptx
@@ -254,7 +254,7 @@
             <a:pPr algn="r" rtl="0"/>
             <a:fld id="{C8F1D84B-F747-4821-8617-FBD61E8F4308}" type="datetime1">
               <a:rPr lang="es-ES" smtClean="0"/>
-              <a:t>16/10/2022</a:t>
+              <a:t>25/10/2022</a:t>
             </a:fld>
             <a:endParaRPr lang="es-ES" dirty="0"/>
           </a:p>
@@ -424,7 +424,7 @@
             <a:fld id="{DA87C823-BB9F-45DA-99AB-416A32E1B948}" type="datetime1">
               <a:rPr lang="es-ES" noProof="0" smtClean="0"/>
               <a:pPr/>
-              <a:t>14/10/2022</a:t>
+              <a:t>25/10/2022</a:t>
             </a:fld>
             <a:endParaRPr lang="es-ES" noProof="0" dirty="0"/>
           </a:p>
@@ -940,7 +940,7 @@
             <a:fld id="{35C83AD5-F5AF-4BDC-901E-85A05CCFFAAA}" type="datetime1">
               <a:rPr lang="es-ES" noProof="0" smtClean="0"/>
               <a:pPr/>
-              <a:t>14/10/2022</a:t>
+              <a:t>25/10/2022</a:t>
             </a:fld>
             <a:endParaRPr lang="es-ES" noProof="0" dirty="0"/>
           </a:p>
@@ -1205,7 +1205,7 @@
             <a:fld id="{40A1DB83-C382-4684-8887-65A03EA4FFF0}" type="datetime1">
               <a:rPr lang="es-ES" noProof="0" smtClean="0"/>
               <a:pPr/>
-              <a:t>14/10/2022</a:t>
+              <a:t>25/10/2022</a:t>
             </a:fld>
             <a:endParaRPr lang="es-ES" noProof="0" dirty="0"/>
           </a:p>
@@ -1455,7 +1455,7 @@
             <a:fld id="{C60E81D3-9B82-44CA-B1F9-FCEFDC87935B}" type="datetime1">
               <a:rPr lang="es-ES" noProof="0" smtClean="0"/>
               <a:pPr/>
-              <a:t>14/10/2022</a:t>
+              <a:t>25/10/2022</a:t>
             </a:fld>
             <a:endParaRPr lang="es-ES" noProof="0" dirty="0"/>
           </a:p>
@@ -1710,7 +1710,7 @@
             <a:fld id="{35C83AD5-F5AF-4BDC-901E-85A05CCFFAAA}" type="datetime1">
               <a:rPr lang="es-ES" noProof="0" smtClean="0"/>
               <a:pPr/>
-              <a:t>14/10/2022</a:t>
+              <a:t>25/10/2022</a:t>
             </a:fld>
             <a:endParaRPr lang="es-ES" noProof="0" dirty="0"/>
           </a:p>
@@ -2020,7 +2020,7 @@
             <a:fld id="{AA1D35CA-82F5-4AD4-B9EC-66E805B73542}" type="datetime1">
               <a:rPr lang="es-ES" noProof="0" smtClean="0"/>
               <a:pPr/>
-              <a:t>14/10/2022</a:t>
+              <a:t>25/10/2022</a:t>
             </a:fld>
             <a:endParaRPr lang="es-ES" noProof="0" dirty="0"/>
           </a:p>
@@ -2337,7 +2337,7 @@
             <a:fld id="{834CCE92-710B-4678-B1B1-EFCAA5CDF075}" type="datetime1">
               <a:rPr lang="es-ES" noProof="0" smtClean="0"/>
               <a:pPr/>
-              <a:t>14/10/2022</a:t>
+              <a:t>25/10/2022</a:t>
             </a:fld>
             <a:endParaRPr lang="es-ES" noProof="0" dirty="0"/>
           </a:p>
@@ -2774,7 +2774,7 @@
             <a:fld id="{83FB0F2C-25D9-4D7E-B43A-29A2E16C960D}" type="datetime1">
               <a:rPr lang="es-ES" noProof="0" smtClean="0"/>
               <a:pPr/>
-              <a:t>14/10/2022</a:t>
+              <a:t>25/10/2022</a:t>
             </a:fld>
             <a:endParaRPr lang="es-ES" noProof="0" dirty="0"/>
           </a:p>
@@ -2884,7 +2884,7 @@
             <a:fld id="{FD34687D-B11B-47A5-95F6-B79DA932A6DF}" type="datetime1">
               <a:rPr lang="es-ES" noProof="0" smtClean="0"/>
               <a:pPr/>
-              <a:t>14/10/2022</a:t>
+              <a:t>25/10/2022</a:t>
             </a:fld>
             <a:endParaRPr lang="es-ES" noProof="0" dirty="0"/>
           </a:p>
@@ -3061,7 +3061,7 @@
             <a:fld id="{93C656DE-1E46-4450-9484-A739B4FADFBC}" type="datetime1">
               <a:rPr lang="es-ES" noProof="0" smtClean="0"/>
               <a:pPr/>
-              <a:t>14/10/2022</a:t>
+              <a:t>25/10/2022</a:t>
             </a:fld>
             <a:endParaRPr lang="es-ES" noProof="0" dirty="0"/>
           </a:p>
@@ -3454,7 +3454,7 @@
             <a:fld id="{35C83AD5-F5AF-4BDC-901E-85A05CCFFAAA}" type="datetime1">
               <a:rPr lang="es-ES" noProof="0" smtClean="0"/>
               <a:pPr/>
-              <a:t>14/10/2022</a:t>
+              <a:t>25/10/2022</a:t>
             </a:fld>
             <a:endParaRPr lang="es-ES" noProof="0" dirty="0"/>
           </a:p>
@@ -3746,7 +3746,7 @@
             <a:fld id="{35C83AD5-F5AF-4BDC-901E-85A05CCFFAAA}" type="datetime1">
               <a:rPr lang="es-ES" noProof="0" smtClean="0"/>
               <a:pPr/>
-              <a:t>14/10/2022</a:t>
+              <a:t>25/10/2022</a:t>
             </a:fld>
             <a:endParaRPr lang="es-ES" noProof="0" dirty="0"/>
           </a:p>
@@ -3960,7 +3960,7 @@
             <a:fld id="{35C83AD5-F5AF-4BDC-901E-85A05CCFFAAA}" type="datetime1">
               <a:rPr lang="es-ES" noProof="0" smtClean="0"/>
               <a:pPr/>
-              <a:t>14/10/2022</a:t>
+              <a:t>25/10/2022</a:t>
             </a:fld>
             <a:endParaRPr lang="es-ES" noProof="0" dirty="0"/>
           </a:p>
@@ -4593,41 +4593,6 @@
       </p:grpSpPr>
       <p:sp>
         <p:nvSpPr>
-          <p:cNvPr id="5" name="Título 4">
-            <a:extLst>
-              <a:ext uri="{FF2B5EF4-FFF2-40B4-BE49-F238E27FC236}">
-                <a16:creationId xmlns:a16="http://schemas.microsoft.com/office/drawing/2014/main" id="{8386BAA2-92EA-0329-2A9B-1436CF65E034}"/>
-              </a:ext>
-            </a:extLst>
-          </p:cNvPr>
-          <p:cNvSpPr>
-            <a:spLocks noGrp="1"/>
-          </p:cNvSpPr>
-          <p:nvPr>
-            <p:ph type="ctrTitle"/>
-          </p:nvPr>
-        </p:nvSpPr>
-        <p:spPr>
-          <a:xfrm>
-            <a:off x="1523602" y="476672"/>
-            <a:ext cx="9141619" cy="2387600"/>
-          </a:xfrm>
-        </p:spPr>
-        <p:txBody>
-          <a:bodyPr/>
-          <a:lstStyle/>
-          <a:p>
-            <a:pPr algn="ctr"/>
-            <a:r>
-              <a:rPr lang="es-ES" sz="6000" b="1" dirty="0"/>
-              <a:t>JavaScript</a:t>
-            </a:r>
-            <a:endParaRPr lang="es-CO" dirty="0"/>
-          </a:p>
-        </p:txBody>
-      </p:sp>
-      <p:sp>
-        <p:nvSpPr>
           <p:cNvPr id="6" name="Subtítulo 5">
             <a:extLst>
               <a:ext uri="{FF2B5EF4-FFF2-40B4-BE49-F238E27FC236}">
@@ -4650,13 +4615,17 @@
         </p:spPr>
         <p:txBody>
           <a:bodyPr>
-            <a:normAutofit/>
+            <a:normAutofit fontScale="85000" lnSpcReduction="10000"/>
           </a:bodyPr>
           <a:lstStyle/>
           <a:p>
             <a:pPr algn="ctr"/>
             <a:r>
-              <a:rPr lang="es-ES" sz="2400" b="1" dirty="0"/>
+              <a:rPr lang="es-ES" sz="3900" b="1" dirty="0">
+                <a:solidFill>
+                  <a:schemeClr val="tx1"/>
+                </a:solidFill>
+              </a:rPr>
               <a:t>CAMILO BOHORQUEZ DALLOS</a:t>
             </a:r>
           </a:p>
@@ -4667,7 +4636,10 @@
               </a:spcAft>
             </a:pPr>
             <a:r>
-              <a:rPr lang="es-CO" sz="2400" kern="50" dirty="0">
+              <a:rPr lang="es-CO" sz="3900" kern="50" dirty="0">
+                <a:solidFill>
+                  <a:schemeClr val="tx1"/>
+                </a:solidFill>
                 <a:latin typeface="+mj-lt"/>
                 <a:ea typeface="WenQuanYi Zen Hei Sharp"/>
                 <a:cs typeface="Lohit Devanagari"/>
@@ -4682,7 +4654,10 @@
               </a:spcAft>
             </a:pPr>
             <a:r>
-              <a:rPr lang="es-CO" sz="2400" kern="50" dirty="0">
+              <a:rPr lang="es-CO" sz="3900" kern="50" dirty="0">
+                <a:solidFill>
+                  <a:schemeClr val="tx1"/>
+                </a:solidFill>
                 <a:latin typeface="+mj-lt"/>
                 <a:ea typeface="WenQuanYi Zen Hei Sharp"/>
                 <a:cs typeface="Lohit Devanagari"/>
@@ -4697,7 +4672,10 @@
               </a:spcAft>
             </a:pPr>
             <a:r>
-              <a:rPr lang="es-CO" sz="2400" kern="50" dirty="0" err="1">
+              <a:rPr lang="es-CO" sz="3900" kern="50" dirty="0" err="1">
+                <a:solidFill>
+                  <a:schemeClr val="tx1"/>
+                </a:solidFill>
                 <a:latin typeface="+mj-lt"/>
                 <a:ea typeface="WenQuanYi Zen Hei Sharp"/>
                 <a:cs typeface="Lohit Devanagari"/>
@@ -4705,7 +4683,10 @@
               <a:t>Msc</a:t>
             </a:r>
             <a:r>
-              <a:rPr lang="es-CO" sz="2400" kern="50" dirty="0">
+              <a:rPr lang="es-CO" sz="3900" kern="50" dirty="0">
+                <a:solidFill>
+                  <a:schemeClr val="tx1"/>
+                </a:solidFill>
                 <a:latin typeface="+mj-lt"/>
                 <a:ea typeface="WenQuanYi Zen Hei Sharp"/>
                 <a:cs typeface="Lohit Devanagari"/>
@@ -4722,6 +4703,53 @@
           </a:p>
         </p:txBody>
       </p:sp>
+      <p:pic>
+        <p:nvPicPr>
+          <p:cNvPr id="1028" name="Picture 4" descr="JavaScript PNG, Transparent JS Logo Free Download - Free Transparent PNG  Logos">
+            <a:extLst>
+              <a:ext uri="{FF2B5EF4-FFF2-40B4-BE49-F238E27FC236}">
+                <a16:creationId xmlns:a16="http://schemas.microsoft.com/office/drawing/2014/main" id="{20F8F291-BD4A-5316-8994-B61CEC5E566C}"/>
+              </a:ext>
+            </a:extLst>
+          </p:cNvPr>
+          <p:cNvPicPr>
+            <a:picLocks noChangeAspect="1" noChangeArrowheads="1"/>
+          </p:cNvPicPr>
+          <p:nvPr/>
+        </p:nvPicPr>
+        <p:blipFill>
+          <a:blip r:embed="rId2">
+            <a:extLst>
+              <a:ext uri="{28A0092B-C50C-407E-A947-70E740481C1C}">
+                <a14:useLocalDpi xmlns:a14="http://schemas.microsoft.com/office/drawing/2010/main" val="0"/>
+              </a:ext>
+            </a:extLst>
+          </a:blip>
+          <a:srcRect/>
+          <a:stretch>
+            <a:fillRect/>
+          </a:stretch>
+        </p:blipFill>
+        <p:spPr bwMode="auto">
+          <a:xfrm>
+            <a:off x="4045020" y="548680"/>
+            <a:ext cx="4098784" cy="2304256"/>
+          </a:xfrm>
+          <a:prstGeom prst="rect">
+            <a:avLst/>
+          </a:prstGeom>
+          <a:noFill/>
+          <a:extLst>
+            <a:ext uri="{909E8E84-426E-40DD-AFC4-6F175D3DCCD1}">
+              <a14:hiddenFill xmlns:a14="http://schemas.microsoft.com/office/drawing/2010/main">
+                <a:solidFill>
+                  <a:srgbClr val="FFFFFF"/>
+                </a:solidFill>
+              </a14:hiddenFill>
+            </a:ext>
+          </a:extLst>
+        </p:spPr>
+      </p:pic>
     </p:spTree>
     <p:extLst>
       <p:ext uri="{BB962C8B-B14F-4D97-AF65-F5344CB8AC3E}">
@@ -13845,7 +13873,7 @@
 <file path=ppt/theme/theme1.xml><?xml version="1.0" encoding="utf-8"?>
 <a:theme xmlns:a="http://schemas.openxmlformats.org/drawingml/2006/main" name="Dividendo">
   <a:themeElements>
-    <a:clrScheme name="Dividendo">
+    <a:clrScheme name="Amarillo">
       <a:dk1>
         <a:sysClr val="windowText" lastClr="000000"/>
       </a:dk1>
@@ -13853,34 +13881,34 @@
         <a:sysClr val="window" lastClr="FFFFFF"/>
       </a:lt1>
       <a:dk2>
-        <a:srgbClr val="3D3D3D"/>
+        <a:srgbClr val="39302A"/>
       </a:dk2>
       <a:lt2>
-        <a:srgbClr val="EBEBEB"/>
+        <a:srgbClr val="E5DEDB"/>
       </a:lt2>
       <a:accent1>
-        <a:srgbClr val="1A3260"/>
+        <a:srgbClr val="FFCA08"/>
       </a:accent1>
       <a:accent2>
-        <a:srgbClr val="4590B8"/>
+        <a:srgbClr val="F8931D"/>
       </a:accent2>
       <a:accent3>
-        <a:srgbClr val="45CBE8"/>
+        <a:srgbClr val="CE8D3E"/>
       </a:accent3>
       <a:accent4>
-        <a:srgbClr val="969FA7"/>
+        <a:srgbClr val="EC7016"/>
       </a:accent4>
       <a:accent5>
-        <a:srgbClr val="A2C777"/>
+        <a:srgbClr val="E64823"/>
       </a:accent5>
       <a:accent6>
-        <a:srgbClr val="42955F"/>
+        <a:srgbClr val="9C6A6A"/>
       </a:accent6>
       <a:hlink>
-        <a:srgbClr val="828282"/>
+        <a:srgbClr val="2998E3"/>
       </a:hlink>
       <a:folHlink>
-        <a:srgbClr val="A5A5A5"/>
+        <a:srgbClr val="7F723D"/>
       </a:folHlink>
     </a:clrScheme>
     <a:fontScheme name="Dividendo">
@@ -14702,15 +14730,6 @@
 </file>
 
 <file path=customXml/item1.xml><?xml version="1.0" encoding="utf-8"?>
-<?mso-contentType ?>
-<FormTemplates xmlns="http://schemas.microsoft.com/sharepoint/v3/contenttype/forms">
-  <Display>DocumentLibraryForm</Display>
-  <Edit>AssetEditForm</Edit>
-  <New>DocumentLibraryForm</New>
-</FormTemplates>
-</file>
-
-<file path=customXml/item2.xml><?xml version="1.0" encoding="utf-8"?>
 <p:properties xmlns:p="http://schemas.microsoft.com/office/2006/metadata/properties" xmlns:xsi="http://www.w3.org/2001/XMLSchema-instance" xmlns:pc="http://schemas.microsoft.com/office/infopath/2007/PartnerControls">
   <documentManagement>
     <LocPublishedLinkedAssetsLookup xmlns="4873beb7-5857-4685-be1f-d57550cc96cc" xsi:nil="true"/>
@@ -14844,6 +14863,15 @@
     <LocMarketGroupTiers2 xmlns="4873beb7-5857-4685-be1f-d57550cc96cc" xsi:nil="true"/>
   </documentManagement>
 </p:properties>
+</file>
+
+<file path=customXml/item2.xml><?xml version="1.0" encoding="utf-8"?>
+<?mso-contentType ?>
+<FormTemplates xmlns="http://schemas.microsoft.com/sharepoint/v3/contenttype/forms">
+  <Display>DocumentLibraryForm</Display>
+  <Edit>AssetEditForm</Edit>
+  <New>DocumentLibraryForm</New>
+</FormTemplates>
 </file>
 
 <file path=customXml/item3.xml><?xml version="1.0" encoding="utf-8"?>
@@ -15887,14 +15915,6 @@
 </file>
 
 <file path=customXml/itemProps1.xml><?xml version="1.0" encoding="utf-8"?>
-<ds:datastoreItem xmlns:ds="http://schemas.openxmlformats.org/officeDocument/2006/customXml" ds:itemID="{3836F65B-1B07-41EE-A0E8-BC6EF3855225}">
-  <ds:schemaRefs>
-    <ds:schemaRef ds:uri="http://schemas.microsoft.com/sharepoint/v3/contenttype/forms"/>
-  </ds:schemaRefs>
-</ds:datastoreItem>
-</file>
-
-<file path=customXml/itemProps2.xml><?xml version="1.0" encoding="utf-8"?>
 <ds:datastoreItem xmlns:ds="http://schemas.openxmlformats.org/officeDocument/2006/customXml" ds:itemID="{60C67BEE-D13F-4BD2-98A5-34D8A0977F68}">
   <ds:schemaRefs>
     <ds:schemaRef ds:uri="http://purl.org/dc/terms/"/>
@@ -15906,6 +15926,14 @@
     <ds:schemaRef ds:uri="http://schemas.openxmlformats.org/package/2006/metadata/core-properties"/>
     <ds:schemaRef ds:uri="4873beb7-5857-4685-be1f-d57550cc96cc"/>
     <ds:schemaRef ds:uri="http://purl.org/dc/dcmitype/"/>
+  </ds:schemaRefs>
+</ds:datastoreItem>
+</file>
+
+<file path=customXml/itemProps2.xml><?xml version="1.0" encoding="utf-8"?>
+<ds:datastoreItem xmlns:ds="http://schemas.openxmlformats.org/officeDocument/2006/customXml" ds:itemID="{3836F65B-1B07-41EE-A0E8-BC6EF3855225}">
+  <ds:schemaRefs>
+    <ds:schemaRef ds:uri="http://schemas.microsoft.com/sharepoint/v3/contenttype/forms"/>
   </ds:schemaRefs>
 </ds:datastoreItem>
 </file>

</xml_diff>